<commit_message>
Update Day1.3 - StrandedOnTheMoon.pptx
</commit_message>
<xml_diff>
--- a/Daily Agendas/Day1.3 - StrandedOnTheMoon.pptx
+++ b/Daily Agendas/Day1.3 - StrandedOnTheMoon.pptx
@@ -7,7 +7,8 @@
   <p:sldIdLst>
     <p:sldId id="256" r:id="rId2"/>
     <p:sldId id="258" r:id="rId3"/>
-    <p:sldId id="257" r:id="rId4"/>
+    <p:sldId id="259" r:id="rId4"/>
+    <p:sldId id="257" r:id="rId5"/>
   </p:sldIdLst>
   <p:sldSz cx="9144000" cy="6858000" type="screen4x3"/>
   <p:notesSz cx="6858000" cy="9144000"/>
@@ -245,7 +246,7 @@
           <a:p>
             <a:fld id="{69DBCF37-83FE-4516-BE5A-9F53FA57CCFA}" type="datetimeFigureOut">
               <a:rPr lang="en-US" smtClean="0"/>
-              <a:t>2/4/2020</a:t>
+              <a:t>2/5/2020</a:t>
             </a:fld>
             <a:endParaRPr lang="en-US"/>
           </a:p>
@@ -415,7 +416,7 @@
           <a:p>
             <a:fld id="{69DBCF37-83FE-4516-BE5A-9F53FA57CCFA}" type="datetimeFigureOut">
               <a:rPr lang="en-US" smtClean="0"/>
-              <a:t>2/4/2020</a:t>
+              <a:t>2/5/2020</a:t>
             </a:fld>
             <a:endParaRPr lang="en-US"/>
           </a:p>
@@ -595,7 +596,7 @@
           <a:p>
             <a:fld id="{69DBCF37-83FE-4516-BE5A-9F53FA57CCFA}" type="datetimeFigureOut">
               <a:rPr lang="en-US" smtClean="0"/>
-              <a:t>2/4/2020</a:t>
+              <a:t>2/5/2020</a:t>
             </a:fld>
             <a:endParaRPr lang="en-US"/>
           </a:p>
@@ -765,7 +766,7 @@
           <a:p>
             <a:fld id="{69DBCF37-83FE-4516-BE5A-9F53FA57CCFA}" type="datetimeFigureOut">
               <a:rPr lang="en-US" smtClean="0"/>
-              <a:t>2/4/2020</a:t>
+              <a:t>2/5/2020</a:t>
             </a:fld>
             <a:endParaRPr lang="en-US"/>
           </a:p>
@@ -1009,7 +1010,7 @@
           <a:p>
             <a:fld id="{69DBCF37-83FE-4516-BE5A-9F53FA57CCFA}" type="datetimeFigureOut">
               <a:rPr lang="en-US" smtClean="0"/>
-              <a:t>2/4/2020</a:t>
+              <a:t>2/5/2020</a:t>
             </a:fld>
             <a:endParaRPr lang="en-US"/>
           </a:p>
@@ -1241,7 +1242,7 @@
           <a:p>
             <a:fld id="{69DBCF37-83FE-4516-BE5A-9F53FA57CCFA}" type="datetimeFigureOut">
               <a:rPr lang="en-US" smtClean="0"/>
-              <a:t>2/4/2020</a:t>
+              <a:t>2/5/2020</a:t>
             </a:fld>
             <a:endParaRPr lang="en-US"/>
           </a:p>
@@ -1608,7 +1609,7 @@
           <a:p>
             <a:fld id="{69DBCF37-83FE-4516-BE5A-9F53FA57CCFA}" type="datetimeFigureOut">
               <a:rPr lang="en-US" smtClean="0"/>
-              <a:t>2/4/2020</a:t>
+              <a:t>2/5/2020</a:t>
             </a:fld>
             <a:endParaRPr lang="en-US"/>
           </a:p>
@@ -1726,7 +1727,7 @@
           <a:p>
             <a:fld id="{69DBCF37-83FE-4516-BE5A-9F53FA57CCFA}" type="datetimeFigureOut">
               <a:rPr lang="en-US" smtClean="0"/>
-              <a:t>2/4/2020</a:t>
+              <a:t>2/5/2020</a:t>
             </a:fld>
             <a:endParaRPr lang="en-US"/>
           </a:p>
@@ -1821,7 +1822,7 @@
           <a:p>
             <a:fld id="{69DBCF37-83FE-4516-BE5A-9F53FA57CCFA}" type="datetimeFigureOut">
               <a:rPr lang="en-US" smtClean="0"/>
-              <a:t>2/4/2020</a:t>
+              <a:t>2/5/2020</a:t>
             </a:fld>
             <a:endParaRPr lang="en-US"/>
           </a:p>
@@ -2098,7 +2099,7 @@
           <a:p>
             <a:fld id="{69DBCF37-83FE-4516-BE5A-9F53FA57CCFA}" type="datetimeFigureOut">
               <a:rPr lang="en-US" smtClean="0"/>
-              <a:t>2/4/2020</a:t>
+              <a:t>2/5/2020</a:t>
             </a:fld>
             <a:endParaRPr lang="en-US"/>
           </a:p>
@@ -2355,7 +2356,7 @@
           <a:p>
             <a:fld id="{69DBCF37-83FE-4516-BE5A-9F53FA57CCFA}" type="datetimeFigureOut">
               <a:rPr lang="en-US" smtClean="0"/>
-              <a:t>2/4/2020</a:t>
+              <a:t>2/5/2020</a:t>
             </a:fld>
             <a:endParaRPr lang="en-US"/>
           </a:p>
@@ -2568,7 +2569,7 @@
           <a:p>
             <a:fld id="{69DBCF37-83FE-4516-BE5A-9F53FA57CCFA}" type="datetimeFigureOut">
               <a:rPr lang="en-US" smtClean="0"/>
-              <a:t>2/4/2020</a:t>
+              <a:t>2/5/2020</a:t>
             </a:fld>
             <a:endParaRPr lang="en-US"/>
           </a:p>
@@ -3055,15 +3056,7 @@
             <a:pPr lvl="1"/>
             <a:r>
               <a:rPr lang="en-CA" dirty="0" smtClean="0"/>
-              <a:t>Activity</a:t>
-            </a:r>
-            <a:r>
-              <a:rPr lang="en-CA" dirty="0" smtClean="0"/>
-              <a:t>: </a:t>
-            </a:r>
-            <a:r>
-              <a:rPr lang="en-CA" dirty="0" smtClean="0"/>
-              <a:t>Stranded On The Moon</a:t>
+              <a:t>Activity: Stranded On The Moon</a:t>
             </a:r>
             <a:endParaRPr lang="en-CA" dirty="0"/>
           </a:p>
@@ -3073,7 +3066,6 @@
               <a:rPr lang="en-CA" dirty="0" smtClean="0"/>
               <a:t>Individual Ranking</a:t>
             </a:r>
-            <a:endParaRPr lang="en-CA" dirty="0" smtClean="0"/>
           </a:p>
           <a:p>
             <a:pPr lvl="2"/>
@@ -3081,7 +3073,6 @@
               <a:rPr lang="en-CA" dirty="0" smtClean="0"/>
               <a:t>Group Ranking</a:t>
             </a:r>
-            <a:endParaRPr lang="en-CA" dirty="0" smtClean="0"/>
           </a:p>
           <a:p>
             <a:pPr lvl="2"/>
@@ -3169,11 +3160,7 @@
           <a:p>
             <a:r>
               <a:rPr lang="en-CA" dirty="0" smtClean="0"/>
-              <a:t>Schedule, </a:t>
-            </a:r>
-            <a:r>
-              <a:rPr lang="en-CA" dirty="0" smtClean="0"/>
-              <a:t>Wed Feb 5</a:t>
+              <a:t>Schedule, Wed Feb 5</a:t>
             </a:r>
             <a:endParaRPr lang="en-US" dirty="0"/>
           </a:p>
@@ -3269,6 +3256,173 @@
 </file>
 
 <file path=ppt/slides/slide3.xml><?xml version="1.0" encoding="utf-8"?>
+<p:sld xmlns:a="http://schemas.openxmlformats.org/drawingml/2006/main" xmlns:r="http://schemas.openxmlformats.org/officeDocument/2006/relationships" xmlns:p="http://schemas.openxmlformats.org/presentationml/2006/main">
+  <p:cSld>
+    <p:spTree>
+      <p:nvGrpSpPr>
+        <p:cNvPr id="1" name=""/>
+        <p:cNvGrpSpPr/>
+        <p:nvPr/>
+      </p:nvGrpSpPr>
+      <p:grpSpPr>
+        <a:xfrm>
+          <a:off x="0" y="0"/>
+          <a:ext cx="0" cy="0"/>
+          <a:chOff x="0" y="0"/>
+          <a:chExt cx="0" cy="0"/>
+        </a:xfrm>
+      </p:grpSpPr>
+      <p:sp>
+        <p:nvSpPr>
+          <p:cNvPr id="4" name="Title 3"/>
+          <p:cNvSpPr>
+            <a:spLocks noGrp="1"/>
+          </p:cNvSpPr>
+          <p:nvPr>
+            <p:ph type="title"/>
+          </p:nvPr>
+        </p:nvSpPr>
+        <p:spPr/>
+        <p:txBody>
+          <a:bodyPr>
+            <a:normAutofit/>
+          </a:bodyPr>
+          <a:lstStyle/>
+          <a:p>
+            <a:pPr algn="ctr"/>
+            <a:r>
+              <a:rPr lang="en-CA" dirty="0" smtClean="0"/>
+              <a:t>Textbook Scavenger Hunt </a:t>
+            </a:r>
+            <a:r>
+              <a:rPr lang="en-CA" dirty="0"/>
+              <a:t>– Feb </a:t>
+            </a:r>
+            <a:r>
+              <a:rPr lang="en-CA" dirty="0" smtClean="0"/>
+              <a:t>05</a:t>
+            </a:r>
+            <a:r>
+              <a:rPr lang="en-CA" dirty="0"/>
+              <a:t/>
+            </a:r>
+            <a:br>
+              <a:rPr lang="en-CA" dirty="0"/>
+            </a:br>
+            <a:r>
+              <a:rPr lang="en-CA" sz="3600" dirty="0"/>
+              <a:t>(Science Boot Camp Day </a:t>
+            </a:r>
+            <a:r>
+              <a:rPr lang="en-CA" sz="3600" dirty="0" smtClean="0"/>
+              <a:t>2)</a:t>
+            </a:r>
+            <a:endParaRPr lang="en-US" sz="3600" dirty="0"/>
+          </a:p>
+        </p:txBody>
+      </p:sp>
+      <p:sp>
+        <p:nvSpPr>
+          <p:cNvPr id="5" name="Content Placeholder 4"/>
+          <p:cNvSpPr>
+            <a:spLocks noGrp="1"/>
+          </p:cNvSpPr>
+          <p:nvPr>
+            <p:ph idx="1"/>
+          </p:nvPr>
+        </p:nvSpPr>
+        <p:spPr/>
+        <p:txBody>
+          <a:bodyPr>
+            <a:normAutofit/>
+          </a:bodyPr>
+          <a:lstStyle/>
+          <a:p>
+            <a:r>
+              <a:rPr lang="en-CA" dirty="0"/>
+              <a:t>Agenda</a:t>
+            </a:r>
+          </a:p>
+          <a:p>
+            <a:pPr lvl="1"/>
+            <a:r>
+              <a:rPr lang="en-CA" dirty="0" smtClean="0"/>
+              <a:t>Exam Review Day</a:t>
+            </a:r>
+          </a:p>
+          <a:p>
+            <a:pPr lvl="1"/>
+            <a:r>
+              <a:rPr lang="en-CA" dirty="0" smtClean="0"/>
+              <a:t>Complete Assigned Work</a:t>
+            </a:r>
+            <a:endParaRPr lang="en-CA" dirty="0"/>
+          </a:p>
+          <a:p>
+            <a:pPr lvl="2"/>
+            <a:r>
+              <a:rPr lang="en-CA" dirty="0" smtClean="0"/>
+              <a:t>Textbook Scavenger Hunt</a:t>
+            </a:r>
+            <a:endParaRPr lang="en-CA" dirty="0" smtClean="0"/>
+          </a:p>
+          <a:p>
+            <a:pPr lvl="2"/>
+            <a:r>
+              <a:rPr lang="en-CA" dirty="0" smtClean="0"/>
+              <a:t>Basic Lab Equipment &amp; Safety</a:t>
+            </a:r>
+            <a:endParaRPr lang="en-CA" dirty="0" smtClean="0"/>
+          </a:p>
+          <a:p>
+            <a:pPr lvl="1"/>
+            <a:endParaRPr lang="en-CA" smtClean="0"/>
+          </a:p>
+          <a:p>
+            <a:pPr lvl="1"/>
+            <a:endParaRPr lang="en-CA" dirty="0" smtClean="0"/>
+          </a:p>
+          <a:p>
+            <a:pPr lvl="1"/>
+            <a:endParaRPr lang="en-CA" dirty="0"/>
+          </a:p>
+          <a:p>
+            <a:r>
+              <a:rPr lang="en-CA" dirty="0"/>
+              <a:t>Upcoming</a:t>
+            </a:r>
+          </a:p>
+          <a:p>
+            <a:pPr lvl="1"/>
+            <a:r>
+              <a:rPr lang="en-CA" dirty="0"/>
+              <a:t>Tomorrow: </a:t>
+            </a:r>
+            <a:r>
+              <a:rPr lang="en-CA" dirty="0" smtClean="0"/>
+              <a:t>White Powders Lab</a:t>
+            </a:r>
+            <a:endParaRPr lang="en-CA" dirty="0"/>
+          </a:p>
+          <a:p>
+            <a:endParaRPr lang="en-US" dirty="0"/>
+          </a:p>
+        </p:txBody>
+      </p:sp>
+    </p:spTree>
+    <p:extLst>
+      <p:ext uri="{BB962C8B-B14F-4D97-AF65-F5344CB8AC3E}">
+        <p14:creationId xmlns:p14="http://schemas.microsoft.com/office/powerpoint/2010/main" val="1588314365"/>
+      </p:ext>
+    </p:extLst>
+  </p:cSld>
+  <p:clrMapOvr>
+    <a:masterClrMapping/>
+  </p:clrMapOvr>
+</p:sld>
+</file>
+
+<file path=ppt/slides/slide4.xml><?xml version="1.0" encoding="utf-8"?>
 <p:sld xmlns:a="http://schemas.openxmlformats.org/drawingml/2006/main" xmlns:r="http://schemas.openxmlformats.org/officeDocument/2006/relationships" xmlns:p="http://schemas.openxmlformats.org/presentationml/2006/main">
   <p:cSld>
     <p:spTree>

</xml_diff>